<commit_message>
atualização slides de aulasS 06Set2023
</commit_message>
<xml_diff>
--- a/01 Classes/Aula 07 RAD Python - Tipos de Dados Aglomerados.pptx
+++ b/01 Classes/Aula 07 RAD Python - Tipos de Dados Aglomerados.pptx
@@ -12856,12 +12856,15 @@
                 <a:cs typeface="Times New Roman" panose="02020603050405020304" pitchFamily="18" charset="0"/>
                 <a:hlinkClick r:id="rId3"/>
               </a:rPr>
-              <a:t>https://www.w3schools.com/python/python_variables.asp</a:t>
-            </a:r>
-            <a:endParaRPr lang="pt-BR" dirty="0">
-              <a:latin typeface="Times New Roman" panose="02020603050405020304" pitchFamily="18" charset="0"/>
-              <a:cs typeface="Times New Roman" panose="02020603050405020304" pitchFamily="18" charset="0"/>
-            </a:endParaRPr>
+              <a:t>https://www.w3schools.com/python/python_datatypes.asp</a:t>
+            </a:r>
+            <a:r>
+              <a:rPr lang="pt-BR" dirty="0">
+                <a:latin typeface="Times New Roman" panose="02020603050405020304" pitchFamily="18" charset="0"/>
+                <a:cs typeface="Times New Roman" panose="02020603050405020304" pitchFamily="18" charset="0"/>
+              </a:rPr>
+              <a:t> </a:t>
+            </a:r>
           </a:p>
           <a:p>
             <a:pPr marL="0" indent="0" algn="just">
@@ -13034,7 +13037,36 @@
             <a:pPr marL="0" indent="0" algn="just">
               <a:buNone/>
             </a:pPr>
-            <a:endParaRPr lang="pt-BR" sz="2000" dirty="0">
+            <a:r>
+              <a:rPr lang="pt-BR" sz="2400" dirty="0">
+                <a:latin typeface="Times New Roman" panose="02020603050405020304" pitchFamily="18" charset="0"/>
+                <a:cs typeface="Times New Roman" panose="02020603050405020304" pitchFamily="18" charset="0"/>
+              </a:rPr>
+              <a:t>[1] </a:t>
+            </a:r>
+            <a:r>
+              <a:rPr lang="pt-BR" sz="2400" b="1" dirty="0">
+                <a:latin typeface="Times New Roman" panose="02020603050405020304" pitchFamily="18" charset="0"/>
+                <a:cs typeface="Times New Roman" panose="02020603050405020304" pitchFamily="18" charset="0"/>
+              </a:rPr>
+              <a:t>Aglomerados</a:t>
+            </a:r>
+            <a:r>
+              <a:rPr lang="pt-BR" sz="2400" dirty="0">
+                <a:latin typeface="Times New Roman" panose="02020603050405020304" pitchFamily="18" charset="0"/>
+                <a:cs typeface="Times New Roman" panose="02020603050405020304" pitchFamily="18" charset="0"/>
+              </a:rPr>
+              <a:t>: </a:t>
+            </a:r>
+            <a:r>
+              <a:rPr lang="pt-BR" sz="2400" dirty="0">
+                <a:latin typeface="Times New Roman" panose="02020603050405020304" pitchFamily="18" charset="0"/>
+                <a:cs typeface="Times New Roman" panose="02020603050405020304" pitchFamily="18" charset="0"/>
+                <a:hlinkClick r:id="rId3"/>
+              </a:rPr>
+              <a:t>https://youtu.be/zGlB7Yl5lZc</a:t>
+            </a:r>
+            <a:endParaRPr lang="pt-BR" sz="2400" dirty="0">
               <a:latin typeface="Times New Roman" panose="02020603050405020304" pitchFamily="18" charset="0"/>
               <a:cs typeface="Times New Roman" panose="02020603050405020304" pitchFamily="18" charset="0"/>
             </a:endParaRPr>
@@ -13043,22 +13075,7 @@
             <a:pPr marL="0" indent="0" algn="just">
               <a:buNone/>
             </a:pPr>
-            <a:r>
-              <a:rPr lang="pt-BR" sz="2000" dirty="0">
-                <a:latin typeface="Times New Roman" panose="02020603050405020304" pitchFamily="18" charset="0"/>
-                <a:cs typeface="Times New Roman" panose="02020603050405020304" pitchFamily="18" charset="0"/>
-              </a:rPr>
-              <a:t>[1] </a:t>
-            </a:r>
-            <a:r>
-              <a:rPr lang="pt-BR" sz="2000" dirty="0">
-                <a:latin typeface="Times New Roman" panose="02020603050405020304" pitchFamily="18" charset="0"/>
-                <a:cs typeface="Times New Roman" panose="02020603050405020304" pitchFamily="18" charset="0"/>
-                <a:hlinkClick r:id="rId3"/>
-              </a:rPr>
-              <a:t>https://www.programiz.com/python-programming/variables-constants-literals</a:t>
-            </a:r>
-            <a:endParaRPr lang="pt-BR" sz="2000" dirty="0">
+            <a:endParaRPr lang="pt-BR" sz="2400" dirty="0">
               <a:latin typeface="Times New Roman" panose="02020603050405020304" pitchFamily="18" charset="0"/>
               <a:cs typeface="Times New Roman" panose="02020603050405020304" pitchFamily="18" charset="0"/>
             </a:endParaRPr>
@@ -13067,7 +13084,48 @@
             <a:pPr marL="0" indent="0" algn="just">
               <a:buNone/>
             </a:pPr>
-            <a:endParaRPr lang="pt-BR" sz="2000" dirty="0">
+            <a:r>
+              <a:rPr lang="pt-BR" sz="2400" dirty="0">
+                <a:latin typeface="Times New Roman" panose="02020603050405020304" pitchFamily="18" charset="0"/>
+                <a:cs typeface="Times New Roman" panose="02020603050405020304" pitchFamily="18" charset="0"/>
+              </a:rPr>
+              <a:t>[2] </a:t>
+            </a:r>
+            <a:r>
+              <a:rPr lang="pt-BR" sz="2400" b="1" dirty="0">
+                <a:latin typeface="Times New Roman" panose="02020603050405020304" pitchFamily="18" charset="0"/>
+                <a:cs typeface="Times New Roman" panose="02020603050405020304" pitchFamily="18" charset="0"/>
+              </a:rPr>
+              <a:t>Aglomerados</a:t>
+            </a:r>
+            <a:r>
+              <a:rPr lang="pt-BR" sz="2400" dirty="0">
+                <a:latin typeface="Times New Roman" panose="02020603050405020304" pitchFamily="18" charset="0"/>
+                <a:cs typeface="Times New Roman" panose="02020603050405020304" pitchFamily="18" charset="0"/>
+              </a:rPr>
+              <a:t>: </a:t>
+            </a:r>
+            <a:r>
+              <a:rPr lang="pt-BR" sz="2400" dirty="0">
+                <a:latin typeface="Times New Roman" panose="02020603050405020304" pitchFamily="18" charset="0"/>
+                <a:cs typeface="Times New Roman" panose="02020603050405020304" pitchFamily="18" charset="0"/>
+                <a:hlinkClick r:id="rId4"/>
+              </a:rPr>
+              <a:t>https://youtu.be/FKX07yoxLJ8</a:t>
+            </a:r>
+            <a:r>
+              <a:rPr lang="pt-BR" sz="2400" dirty="0">
+                <a:latin typeface="Times New Roman" panose="02020603050405020304" pitchFamily="18" charset="0"/>
+                <a:cs typeface="Times New Roman" panose="02020603050405020304" pitchFamily="18" charset="0"/>
+              </a:rPr>
+              <a:t> </a:t>
+            </a:r>
+          </a:p>
+          <a:p>
+            <a:pPr marL="0" indent="0" algn="just">
+              <a:buNone/>
+            </a:pPr>
+            <a:endParaRPr lang="pt-BR" sz="2400" dirty="0">
               <a:latin typeface="Times New Roman" panose="02020603050405020304" pitchFamily="18" charset="0"/>
               <a:cs typeface="Times New Roman" panose="02020603050405020304" pitchFamily="18" charset="0"/>
             </a:endParaRPr>
@@ -13077,21 +13135,63 @@
               <a:buNone/>
             </a:pPr>
             <a:r>
-              <a:rPr lang="pt-BR" sz="2000" dirty="0">
-                <a:latin typeface="Times New Roman" panose="02020603050405020304" pitchFamily="18" charset="0"/>
-                <a:cs typeface="Times New Roman" panose="02020603050405020304" pitchFamily="18" charset="0"/>
-              </a:rPr>
-              <a:t>[2] </a:t>
-            </a:r>
-            <a:r>
-              <a:rPr lang="pt-BR" sz="2000" dirty="0">
-                <a:latin typeface="Times New Roman" panose="02020603050405020304" pitchFamily="18" charset="0"/>
-                <a:cs typeface="Times New Roman" panose="02020603050405020304" pitchFamily="18" charset="0"/>
-                <a:hlinkClick r:id="rId4"/>
-              </a:rPr>
-              <a:t>https://www.programiz.com/python-programming/examples/swap-variables</a:t>
-            </a:r>
-            <a:endParaRPr lang="pt-BR" sz="2000" dirty="0">
+              <a:rPr lang="pt-BR" sz="2400" dirty="0">
+                <a:latin typeface="Times New Roman" panose="02020603050405020304" pitchFamily="18" charset="0"/>
+                <a:cs typeface="Times New Roman" panose="02020603050405020304" pitchFamily="18" charset="0"/>
+              </a:rPr>
+              <a:t>[3] </a:t>
+            </a:r>
+            <a:r>
+              <a:rPr lang="pt-BR" sz="2400" b="1" dirty="0">
+                <a:latin typeface="Times New Roman" panose="02020603050405020304" pitchFamily="18" charset="0"/>
+                <a:cs typeface="Times New Roman" panose="02020603050405020304" pitchFamily="18" charset="0"/>
+              </a:rPr>
+              <a:t>Tuplas Nomeadas</a:t>
+            </a:r>
+            <a:r>
+              <a:rPr lang="pt-BR" sz="2400" dirty="0">
+                <a:latin typeface="Times New Roman" panose="02020603050405020304" pitchFamily="18" charset="0"/>
+                <a:cs typeface="Times New Roman" panose="02020603050405020304" pitchFamily="18" charset="0"/>
+              </a:rPr>
+              <a:t>:</a:t>
+            </a:r>
+          </a:p>
+          <a:p>
+            <a:pPr marL="0" indent="0" algn="just">
+              <a:buNone/>
+            </a:pPr>
+            <a:r>
+              <a:rPr lang="pt-BR" sz="2400">
+                <a:latin typeface="Times New Roman" panose="02020603050405020304" pitchFamily="18" charset="0"/>
+                <a:cs typeface="Times New Roman" panose="02020603050405020304" pitchFamily="18" charset="0"/>
+              </a:rPr>
+              <a:t>      </a:t>
+            </a:r>
+            <a:r>
+              <a:rPr lang="pt-BR" sz="2400">
+                <a:latin typeface="Times New Roman" panose="02020603050405020304" pitchFamily="18" charset="0"/>
+                <a:cs typeface="Times New Roman" panose="02020603050405020304" pitchFamily="18" charset="0"/>
+                <a:hlinkClick r:id="rId5"/>
+              </a:rPr>
+              <a:t>https</a:t>
+            </a:r>
+            <a:r>
+              <a:rPr lang="pt-BR" sz="2400" dirty="0">
+                <a:latin typeface="Times New Roman" panose="02020603050405020304" pitchFamily="18" charset="0"/>
+                <a:cs typeface="Times New Roman" panose="02020603050405020304" pitchFamily="18" charset="0"/>
+                <a:hlinkClick r:id="rId5"/>
+              </a:rPr>
+              <a:t>://www.youtube.com/watch?v</a:t>
+            </a:r>
+            <a:r>
+              <a:rPr lang="pt-BR" sz="2400">
+                <a:latin typeface="Times New Roman" panose="02020603050405020304" pitchFamily="18" charset="0"/>
+                <a:cs typeface="Times New Roman" panose="02020603050405020304" pitchFamily="18" charset="0"/>
+                <a:hlinkClick r:id="rId5"/>
+              </a:rPr>
+              <a:t>=IkoaXbLsUg8</a:t>
+            </a:r>
+            <a:endParaRPr lang="pt-BR" sz="2400" dirty="0">
               <a:latin typeface="Times New Roman" panose="02020603050405020304" pitchFamily="18" charset="0"/>
               <a:cs typeface="Times New Roman" panose="02020603050405020304" pitchFamily="18" charset="0"/>
             </a:endParaRPr>
@@ -13100,7 +13200,7 @@
             <a:pPr marL="0" indent="0" algn="just">
               <a:buNone/>
             </a:pPr>
-            <a:endParaRPr lang="pt-BR" sz="2000" dirty="0">
+            <a:endParaRPr lang="pt-BR" sz="2400" dirty="0">
               <a:latin typeface="Times New Roman" panose="02020603050405020304" pitchFamily="18" charset="0"/>
               <a:cs typeface="Times New Roman" panose="02020603050405020304" pitchFamily="18" charset="0"/>
             </a:endParaRPr>
@@ -13109,75 +13209,7 @@
             <a:pPr marL="0" indent="0" algn="just">
               <a:buNone/>
             </a:pPr>
-            <a:r>
-              <a:rPr lang="pt-BR" sz="2000" dirty="0">
-                <a:latin typeface="Times New Roman" panose="02020603050405020304" pitchFamily="18" charset="0"/>
-                <a:cs typeface="Times New Roman" panose="02020603050405020304" pitchFamily="18" charset="0"/>
-              </a:rPr>
-              <a:t>- </a:t>
-            </a:r>
-            <a:r>
-              <a:rPr lang="pt-BR" sz="2000" dirty="0" err="1">
-                <a:latin typeface="Times New Roman" panose="02020603050405020304" pitchFamily="18" charset="0"/>
-                <a:cs typeface="Times New Roman" panose="02020603050405020304" pitchFamily="18" charset="0"/>
-              </a:rPr>
-              <a:t>Tuplas</a:t>
-            </a:r>
-            <a:r>
-              <a:rPr lang="pt-BR" sz="2000" dirty="0">
-                <a:latin typeface="Times New Roman" panose="02020603050405020304" pitchFamily="18" charset="0"/>
-                <a:cs typeface="Times New Roman" panose="02020603050405020304" pitchFamily="18" charset="0"/>
-              </a:rPr>
-              <a:t> Nomeadas</a:t>
-            </a:r>
-          </a:p>
-          <a:p>
-            <a:pPr marL="0" indent="0" algn="just">
-              <a:buNone/>
-            </a:pPr>
-            <a:r>
-              <a:rPr lang="pt-BR" sz="2000" dirty="0">
-                <a:latin typeface="Times New Roman" panose="02020603050405020304" pitchFamily="18" charset="0"/>
-                <a:cs typeface="Times New Roman" panose="02020603050405020304" pitchFamily="18" charset="0"/>
-              </a:rPr>
-              <a:t>[3] </a:t>
-            </a:r>
-            <a:r>
-              <a:rPr lang="pt-BR" sz="2000" dirty="0">
-                <a:latin typeface="Times New Roman" panose="02020603050405020304" pitchFamily="18" charset="0"/>
-                <a:cs typeface="Times New Roman" panose="02020603050405020304" pitchFamily="18" charset="0"/>
-                <a:hlinkClick r:id="rId5"/>
-              </a:rPr>
-              <a:t>https://www.youtube.com/watch?v=IkoaXbLsUg8</a:t>
-            </a:r>
-            <a:endParaRPr lang="pt-BR" sz="2000" dirty="0">
-              <a:latin typeface="Times New Roman" panose="02020603050405020304" pitchFamily="18" charset="0"/>
-              <a:cs typeface="Times New Roman" panose="02020603050405020304" pitchFamily="18" charset="0"/>
-            </a:endParaRPr>
-          </a:p>
-          <a:p>
-            <a:pPr marL="0" indent="0" algn="just">
-              <a:buNone/>
-            </a:pPr>
-            <a:endParaRPr lang="pt-BR" sz="2000" dirty="0">
-              <a:latin typeface="Times New Roman" panose="02020603050405020304" pitchFamily="18" charset="0"/>
-              <a:cs typeface="Times New Roman" panose="02020603050405020304" pitchFamily="18" charset="0"/>
-            </a:endParaRPr>
-          </a:p>
-          <a:p>
-            <a:pPr marL="0" indent="0" algn="just">
-              <a:buNone/>
-            </a:pPr>
-            <a:endParaRPr lang="pt-BR" sz="2000" dirty="0">
-              <a:latin typeface="Times New Roman" panose="02020603050405020304" pitchFamily="18" charset="0"/>
-              <a:cs typeface="Times New Roman" panose="02020603050405020304" pitchFamily="18" charset="0"/>
-            </a:endParaRPr>
-          </a:p>
-          <a:p>
-            <a:pPr marL="0" indent="0" algn="just">
-              <a:buNone/>
-            </a:pPr>
-            <a:endParaRPr lang="pt-BR" sz="2000" dirty="0">
+            <a:endParaRPr lang="pt-BR" sz="2400" dirty="0">
               <a:latin typeface="Calibri" panose="020F0502020204030204" pitchFamily="34" charset="0"/>
             </a:endParaRPr>
           </a:p>

</xml_diff>

<commit_message>
Python RAD ajustess 25/09/2024 2024.2
</commit_message>
<xml_diff>
--- a/01 Classes/Aula 07 RAD Python - Tipos de Dados Aglomerados.pptx
+++ b/01 Classes/Aula 07 RAD Python - Tipos de Dados Aglomerados.pptx
@@ -2117,7 +2117,7 @@
           <a:p>
             <a:fld id="{48A87A34-81AB-432B-8DAE-1953F412C126}" type="datetimeFigureOut">
               <a:rPr lang="en-US" smtClean="0"/>
-              <a:t>9/6/2023</a:t>
+              <a:t>9/25/2024</a:t>
             </a:fld>
             <a:endParaRPr lang="en-US" dirty="0"/>
           </a:p>
@@ -2328,7 +2328,7 @@
           <a:p>
             <a:fld id="{48A87A34-81AB-432B-8DAE-1953F412C126}" type="datetimeFigureOut">
               <a:rPr lang="en-US" smtClean="0"/>
-              <a:t>9/6/2023</a:t>
+              <a:t>9/25/2024</a:t>
             </a:fld>
             <a:endParaRPr lang="en-US" dirty="0"/>
           </a:p>
@@ -2543,7 +2543,7 @@
           <a:p>
             <a:fld id="{48A87A34-81AB-432B-8DAE-1953F412C126}" type="datetimeFigureOut">
               <a:rPr lang="en-US" smtClean="0"/>
-              <a:t>9/6/2023</a:t>
+              <a:t>9/25/2024</a:t>
             </a:fld>
             <a:endParaRPr lang="en-US" dirty="0"/>
           </a:p>
@@ -2911,7 +2911,7 @@
           <a:p>
             <a:fld id="{48A87A34-81AB-432B-8DAE-1953F412C126}" type="datetimeFigureOut">
               <a:rPr lang="en-US" smtClean="0"/>
-              <a:t>9/6/2023</a:t>
+              <a:t>9/25/2024</a:t>
             </a:fld>
             <a:endParaRPr lang="en-US" dirty="0"/>
           </a:p>
@@ -3190,7 +3190,7 @@
           <a:p>
             <a:fld id="{48A87A34-81AB-432B-8DAE-1953F412C126}" type="datetimeFigureOut">
               <a:rPr lang="en-US" smtClean="0"/>
-              <a:t>9/6/2023</a:t>
+              <a:t>9/25/2024</a:t>
             </a:fld>
             <a:endParaRPr lang="en-US" dirty="0"/>
           </a:p>
@@ -3458,7 +3458,7 @@
           <a:p>
             <a:fld id="{48A87A34-81AB-432B-8DAE-1953F412C126}" type="datetimeFigureOut">
               <a:rPr lang="en-US" smtClean="0"/>
-              <a:t>9/6/2023</a:t>
+              <a:t>9/25/2024</a:t>
             </a:fld>
             <a:endParaRPr lang="en-US" dirty="0"/>
           </a:p>
@@ -3874,7 +3874,7 @@
           <a:p>
             <a:fld id="{48A87A34-81AB-432B-8DAE-1953F412C126}" type="datetimeFigureOut">
               <a:rPr lang="en-US" smtClean="0"/>
-              <a:t>9/6/2023</a:t>
+              <a:t>9/25/2024</a:t>
             </a:fld>
             <a:endParaRPr lang="en-US" dirty="0"/>
           </a:p>
@@ -4023,7 +4023,7 @@
           <a:p>
             <a:fld id="{48A87A34-81AB-432B-8DAE-1953F412C126}" type="datetimeFigureOut">
               <a:rPr lang="en-US" smtClean="0"/>
-              <a:t>9/6/2023</a:t>
+              <a:t>9/25/2024</a:t>
             </a:fld>
             <a:endParaRPr lang="en-US" dirty="0"/>
           </a:p>
@@ -4149,7 +4149,7 @@
           <a:p>
             <a:fld id="{48A87A34-81AB-432B-8DAE-1953F412C126}" type="datetimeFigureOut">
               <a:rPr lang="en-US" smtClean="0"/>
-              <a:t>9/6/2023</a:t>
+              <a:t>9/25/2024</a:t>
             </a:fld>
             <a:endParaRPr lang="en-US" dirty="0"/>
           </a:p>
@@ -4400,7 +4400,7 @@
           <a:p>
             <a:fld id="{48A87A34-81AB-432B-8DAE-1953F412C126}" type="datetimeFigureOut">
               <a:rPr lang="en-US" smtClean="0"/>
-              <a:t>9/6/2023</a:t>
+              <a:t>9/25/2024</a:t>
             </a:fld>
             <a:endParaRPr lang="en-US" dirty="0"/>
           </a:p>
@@ -4846,7 +4846,7 @@
             <a:fld id="{48A87A34-81AB-432B-8DAE-1953F412C126}" type="datetimeFigureOut">
               <a:rPr lang="en-US" smtClean="0"/>
               <a:pPr/>
-              <a:t>9/6/2023</a:t>
+              <a:t>9/25/2024</a:t>
             </a:fld>
             <a:endParaRPr lang="en-US" dirty="0"/>
           </a:p>
@@ -5174,7 +5174,7 @@
             <a:fld id="{48A87A34-81AB-432B-8DAE-1953F412C126}" type="datetimeFigureOut">
               <a:rPr lang="en-US" smtClean="0"/>
               <a:pPr/>
-              <a:t>9/6/2023</a:t>
+              <a:t>9/25/2024</a:t>
             </a:fld>
             <a:endParaRPr lang="en-US" dirty="0"/>
           </a:p>
@@ -7010,7 +7010,7 @@
                 <a:latin typeface="Times New Roman" panose="02020603050405020304" pitchFamily="18" charset="0"/>
                 <a:cs typeface="Times New Roman" panose="02020603050405020304" pitchFamily="18" charset="0"/>
               </a:rPr>
-              <a:t>[1:3:2]) =&gt; 4, 7</a:t>
+              <a:t>[1:3:2]) =&gt; 4</a:t>
             </a:r>
           </a:p>
           <a:p>
@@ -10397,7 +10397,7 @@
                 <a:latin typeface="Times New Roman" panose="02020603050405020304" pitchFamily="18" charset="0"/>
                 <a:cs typeface="Times New Roman" panose="02020603050405020304" pitchFamily="18" charset="0"/>
               </a:rPr>
-              <a:t> = (15, 9.4, “pera”)</a:t>
+              <a:t> = (15, 9.4, "pera")</a:t>
             </a:r>
           </a:p>
           <a:p>
@@ -10609,7 +10609,7 @@
                 <a:latin typeface="Times New Roman" panose="02020603050405020304" pitchFamily="18" charset="0"/>
                 <a:cs typeface="Times New Roman" panose="02020603050405020304" pitchFamily="18" charset="0"/>
               </a:rPr>
-              <a:t>cliente = (“Julia Cardoso", "01234567890", 7000.0, 17)</a:t>
+              <a:t>cliente = ("Julia Cardoso", "01234567890", 7000.0, 17)</a:t>
             </a:r>
           </a:p>
           <a:p>
@@ -11755,7 +11755,7 @@
                 <a:latin typeface="Times New Roman" panose="02020603050405020304" pitchFamily="18" charset="0"/>
                 <a:cs typeface="Times New Roman" panose="02020603050405020304" pitchFamily="18" charset="0"/>
               </a:rPr>
-              <a:t>(‘Cliente’, ‘nome </a:t>
+              <a:t>("Cliente", "nome </a:t>
             </a:r>
             <a:r>
               <a:rPr lang="pt-BR" sz="2400" dirty="0" err="1">
@@ -11769,7 +11769,7 @@
                 <a:latin typeface="Times New Roman" panose="02020603050405020304" pitchFamily="18" charset="0"/>
                 <a:cs typeface="Times New Roman" panose="02020603050405020304" pitchFamily="18" charset="0"/>
               </a:rPr>
-              <a:t> limite compras’)</a:t>
+              <a:t> limite compras")</a:t>
             </a:r>
           </a:p>
           <a:p>
@@ -11788,7 +11788,7 @@
                 <a:latin typeface="Times New Roman" panose="02020603050405020304" pitchFamily="18" charset="0"/>
                 <a:cs typeface="Times New Roman" panose="02020603050405020304" pitchFamily="18" charset="0"/>
               </a:rPr>
-              <a:t> = Cliente(‘Fulano’, ‘01234567890’, 5000.00, 300.00)</a:t>
+              <a:t> = Cliente("Fulano", "01234567890", 5000.00, 300.00)</a:t>
             </a:r>
           </a:p>
           <a:p>

</xml_diff>